<commit_message>
solves [Question] Auth config when using SAP API Business Hub #18
</commit_message>
<xml_diff>
--- a/assets/drawings.pptx
+++ b/assets/drawings.pptx
@@ -261,7 +261,7 @@
           <a:p>
             <a:fld id="{40E102C9-DE61-4CD8-AC35-112A0980813C}" type="datetimeFigureOut">
               <a:rPr lang="en-DE" smtClean="0"/>
-              <a:t>30/12/2022</a:t>
+              <a:t>02/01/2023</a:t>
             </a:fld>
             <a:endParaRPr lang="en-DE"/>
           </a:p>
@@ -461,7 +461,7 @@
           <a:p>
             <a:fld id="{40E102C9-DE61-4CD8-AC35-112A0980813C}" type="datetimeFigureOut">
               <a:rPr lang="en-DE" smtClean="0"/>
-              <a:t>30/12/2022</a:t>
+              <a:t>02/01/2023</a:t>
             </a:fld>
             <a:endParaRPr lang="en-DE"/>
           </a:p>
@@ -671,7 +671,7 @@
           <a:p>
             <a:fld id="{40E102C9-DE61-4CD8-AC35-112A0980813C}" type="datetimeFigureOut">
               <a:rPr lang="en-DE" smtClean="0"/>
-              <a:t>30/12/2022</a:t>
+              <a:t>02/01/2023</a:t>
             </a:fld>
             <a:endParaRPr lang="en-DE"/>
           </a:p>
@@ -871,7 +871,7 @@
           <a:p>
             <a:fld id="{40E102C9-DE61-4CD8-AC35-112A0980813C}" type="datetimeFigureOut">
               <a:rPr lang="en-DE" smtClean="0"/>
-              <a:t>30/12/2022</a:t>
+              <a:t>02/01/2023</a:t>
             </a:fld>
             <a:endParaRPr lang="en-DE"/>
           </a:p>
@@ -1147,7 +1147,7 @@
           <a:p>
             <a:fld id="{40E102C9-DE61-4CD8-AC35-112A0980813C}" type="datetimeFigureOut">
               <a:rPr lang="en-DE" smtClean="0"/>
-              <a:t>30/12/2022</a:t>
+              <a:t>02/01/2023</a:t>
             </a:fld>
             <a:endParaRPr lang="en-DE"/>
           </a:p>
@@ -1415,7 +1415,7 @@
           <a:p>
             <a:fld id="{40E102C9-DE61-4CD8-AC35-112A0980813C}" type="datetimeFigureOut">
               <a:rPr lang="en-DE" smtClean="0"/>
-              <a:t>30/12/2022</a:t>
+              <a:t>02/01/2023</a:t>
             </a:fld>
             <a:endParaRPr lang="en-DE"/>
           </a:p>
@@ -1830,7 +1830,7 @@
           <a:p>
             <a:fld id="{40E102C9-DE61-4CD8-AC35-112A0980813C}" type="datetimeFigureOut">
               <a:rPr lang="en-DE" smtClean="0"/>
-              <a:t>30/12/2022</a:t>
+              <a:t>02/01/2023</a:t>
             </a:fld>
             <a:endParaRPr lang="en-DE"/>
           </a:p>
@@ -1972,7 +1972,7 @@
           <a:p>
             <a:fld id="{40E102C9-DE61-4CD8-AC35-112A0980813C}" type="datetimeFigureOut">
               <a:rPr lang="en-DE" smtClean="0"/>
-              <a:t>30/12/2022</a:t>
+              <a:t>02/01/2023</a:t>
             </a:fld>
             <a:endParaRPr lang="en-DE"/>
           </a:p>
@@ -2085,7 +2085,7 @@
           <a:p>
             <a:fld id="{40E102C9-DE61-4CD8-AC35-112A0980813C}" type="datetimeFigureOut">
               <a:rPr lang="en-DE" smtClean="0"/>
-              <a:t>30/12/2022</a:t>
+              <a:t>02/01/2023</a:t>
             </a:fld>
             <a:endParaRPr lang="en-DE"/>
           </a:p>
@@ -2398,7 +2398,7 @@
           <a:p>
             <a:fld id="{40E102C9-DE61-4CD8-AC35-112A0980813C}" type="datetimeFigureOut">
               <a:rPr lang="en-DE" smtClean="0"/>
-              <a:t>30/12/2022</a:t>
+              <a:t>02/01/2023</a:t>
             </a:fld>
             <a:endParaRPr lang="en-DE"/>
           </a:p>
@@ -2687,7 +2687,7 @@
           <a:p>
             <a:fld id="{40E102C9-DE61-4CD8-AC35-112A0980813C}" type="datetimeFigureOut">
               <a:rPr lang="en-DE" smtClean="0"/>
-              <a:t>30/12/2022</a:t>
+              <a:t>02/01/2023</a:t>
             </a:fld>
             <a:endParaRPr lang="en-DE"/>
           </a:p>
@@ -2930,7 +2930,7 @@
           <a:p>
             <a:fld id="{40E102C9-DE61-4CD8-AC35-112A0980813C}" type="datetimeFigureOut">
               <a:rPr lang="en-DE" smtClean="0"/>
-              <a:t>30/12/2022</a:t>
+              <a:t>02/01/2023</a:t>
             </a:fld>
             <a:endParaRPr lang="en-DE"/>
           </a:p>
@@ -3599,7 +3599,7 @@
         </p:blipFill>
         <p:spPr>
           <a:xfrm>
-            <a:off x="5403006" y="4067853"/>
+            <a:off x="5330970" y="4067852"/>
             <a:ext cx="326768" cy="326768"/>
           </a:xfrm>
           <a:prstGeom prst="rect">

</xml_diff>

<commit_message>
image adjust, gh codespaces
</commit_message>
<xml_diff>
--- a/assets/drawings.pptx
+++ b/assets/drawings.pptx
@@ -261,7 +261,7 @@
           <a:p>
             <a:fld id="{40E102C9-DE61-4CD8-AC35-112A0980813C}" type="datetimeFigureOut">
               <a:rPr lang="en-DE" smtClean="0"/>
-              <a:t>02/01/2023</a:t>
+              <a:t>14/02/2023</a:t>
             </a:fld>
             <a:endParaRPr lang="en-DE"/>
           </a:p>
@@ -461,7 +461,7 @@
           <a:p>
             <a:fld id="{40E102C9-DE61-4CD8-AC35-112A0980813C}" type="datetimeFigureOut">
               <a:rPr lang="en-DE" smtClean="0"/>
-              <a:t>02/01/2023</a:t>
+              <a:t>14/02/2023</a:t>
             </a:fld>
             <a:endParaRPr lang="en-DE"/>
           </a:p>
@@ -671,7 +671,7 @@
           <a:p>
             <a:fld id="{40E102C9-DE61-4CD8-AC35-112A0980813C}" type="datetimeFigureOut">
               <a:rPr lang="en-DE" smtClean="0"/>
-              <a:t>02/01/2023</a:t>
+              <a:t>14/02/2023</a:t>
             </a:fld>
             <a:endParaRPr lang="en-DE"/>
           </a:p>
@@ -871,7 +871,7 @@
           <a:p>
             <a:fld id="{40E102C9-DE61-4CD8-AC35-112A0980813C}" type="datetimeFigureOut">
               <a:rPr lang="en-DE" smtClean="0"/>
-              <a:t>02/01/2023</a:t>
+              <a:t>14/02/2023</a:t>
             </a:fld>
             <a:endParaRPr lang="en-DE"/>
           </a:p>
@@ -1147,7 +1147,7 @@
           <a:p>
             <a:fld id="{40E102C9-DE61-4CD8-AC35-112A0980813C}" type="datetimeFigureOut">
               <a:rPr lang="en-DE" smtClean="0"/>
-              <a:t>02/01/2023</a:t>
+              <a:t>14/02/2023</a:t>
             </a:fld>
             <a:endParaRPr lang="en-DE"/>
           </a:p>
@@ -1415,7 +1415,7 @@
           <a:p>
             <a:fld id="{40E102C9-DE61-4CD8-AC35-112A0980813C}" type="datetimeFigureOut">
               <a:rPr lang="en-DE" smtClean="0"/>
-              <a:t>02/01/2023</a:t>
+              <a:t>14/02/2023</a:t>
             </a:fld>
             <a:endParaRPr lang="en-DE"/>
           </a:p>
@@ -1830,7 +1830,7 @@
           <a:p>
             <a:fld id="{40E102C9-DE61-4CD8-AC35-112A0980813C}" type="datetimeFigureOut">
               <a:rPr lang="en-DE" smtClean="0"/>
-              <a:t>02/01/2023</a:t>
+              <a:t>14/02/2023</a:t>
             </a:fld>
             <a:endParaRPr lang="en-DE"/>
           </a:p>
@@ -1972,7 +1972,7 @@
           <a:p>
             <a:fld id="{40E102C9-DE61-4CD8-AC35-112A0980813C}" type="datetimeFigureOut">
               <a:rPr lang="en-DE" smtClean="0"/>
-              <a:t>02/01/2023</a:t>
+              <a:t>14/02/2023</a:t>
             </a:fld>
             <a:endParaRPr lang="en-DE"/>
           </a:p>
@@ -2085,7 +2085,7 @@
           <a:p>
             <a:fld id="{40E102C9-DE61-4CD8-AC35-112A0980813C}" type="datetimeFigureOut">
               <a:rPr lang="en-DE" smtClean="0"/>
-              <a:t>02/01/2023</a:t>
+              <a:t>14/02/2023</a:t>
             </a:fld>
             <a:endParaRPr lang="en-DE"/>
           </a:p>
@@ -2398,7 +2398,7 @@
           <a:p>
             <a:fld id="{40E102C9-DE61-4CD8-AC35-112A0980813C}" type="datetimeFigureOut">
               <a:rPr lang="en-DE" smtClean="0"/>
-              <a:t>02/01/2023</a:t>
+              <a:t>14/02/2023</a:t>
             </a:fld>
             <a:endParaRPr lang="en-DE"/>
           </a:p>
@@ -2687,7 +2687,7 @@
           <a:p>
             <a:fld id="{40E102C9-DE61-4CD8-AC35-112A0980813C}" type="datetimeFigureOut">
               <a:rPr lang="en-DE" smtClean="0"/>
-              <a:t>02/01/2023</a:t>
+              <a:t>14/02/2023</a:t>
             </a:fld>
             <a:endParaRPr lang="en-DE"/>
           </a:p>
@@ -2930,7 +2930,7 @@
           <a:p>
             <a:fld id="{40E102C9-DE61-4CD8-AC35-112A0980813C}" type="datetimeFigureOut">
               <a:rPr lang="en-DE" smtClean="0"/>
-              <a:t>02/01/2023</a:t>
+              <a:t>14/02/2023</a:t>
             </a:fld>
             <a:endParaRPr lang="en-DE"/>
           </a:p>
@@ -3695,53 +3695,6 @@
       </p:pic>
       <p:pic>
         <p:nvPicPr>
-          <p:cNvPr id="1030" name="Picture 6" descr="GitHub Logos and Usage · GitHub">
-            <a:extLst>
-              <a:ext uri="{FF2B5EF4-FFF2-40B4-BE49-F238E27FC236}">
-                <a16:creationId xmlns:a16="http://schemas.microsoft.com/office/drawing/2014/main" id="{FADBE0A0-C110-FEAA-BE4E-667C652AC2FC}"/>
-              </a:ext>
-            </a:extLst>
-          </p:cNvPr>
-          <p:cNvPicPr>
-            <a:picLocks noChangeAspect="1" noChangeArrowheads="1"/>
-          </p:cNvPicPr>
-          <p:nvPr/>
-        </p:nvPicPr>
-        <p:blipFill>
-          <a:blip r:embed="rId13">
-            <a:extLst>
-              <a:ext uri="{28A0092B-C50C-407E-A947-70E740481C1C}">
-                <a14:useLocalDpi xmlns:a14="http://schemas.microsoft.com/office/drawing/2010/main" val="0"/>
-              </a:ext>
-            </a:extLst>
-          </a:blip>
-          <a:srcRect/>
-          <a:stretch>
-            <a:fillRect/>
-          </a:stretch>
-        </p:blipFill>
-        <p:spPr bwMode="auto">
-          <a:xfrm>
-            <a:off x="95444" y="1776072"/>
-            <a:ext cx="759084" cy="759084"/>
-          </a:xfrm>
-          <a:prstGeom prst="rect">
-            <a:avLst/>
-          </a:prstGeom>
-          <a:noFill/>
-          <a:extLst>
-            <a:ext uri="{909E8E84-426E-40DD-AFC4-6F175D3DCCD1}">
-              <a14:hiddenFill xmlns:a14="http://schemas.microsoft.com/office/drawing/2010/main">
-                <a:solidFill>
-                  <a:srgbClr val="FFFFFF"/>
-                </a:solidFill>
-              </a14:hiddenFill>
-            </a:ext>
-          </a:extLst>
-        </p:spPr>
-      </p:pic>
-      <p:pic>
-        <p:nvPicPr>
           <p:cNvPr id="16" name="Graphic 15">
             <a:extLst>
               <a:ext uri="{FF2B5EF4-FFF2-40B4-BE49-F238E27FC236}">
@@ -3755,13 +3708,13 @@
           <p:nvPr/>
         </p:nvPicPr>
         <p:blipFill>
-          <a:blip r:embed="rId14">
+          <a:blip r:embed="rId13">
             <a:extLst>
               <a:ext uri="{28A0092B-C50C-407E-A947-70E740481C1C}">
                 <a14:useLocalDpi xmlns:a14="http://schemas.microsoft.com/office/drawing/2010/main" val="0"/>
               </a:ext>
               <a:ext uri="{96DAC541-7B7A-43D3-8B79-37D633B846F1}">
-                <asvg:svgBlip xmlns:asvg="http://schemas.microsoft.com/office/drawing/2016/SVG/main" r:embed="rId15"/>
+                <asvg:svgBlip xmlns:asvg="http://schemas.microsoft.com/office/drawing/2016/SVG/main" r:embed="rId14"/>
               </a:ext>
             </a:extLst>
           </a:blip>
@@ -3839,13 +3792,13 @@
           <p:nvPr/>
         </p:nvPicPr>
         <p:blipFill>
-          <a:blip r:embed="rId16">
+          <a:blip r:embed="rId15">
             <a:extLst>
               <a:ext uri="{28A0092B-C50C-407E-A947-70E740481C1C}">
                 <a14:useLocalDpi xmlns:a14="http://schemas.microsoft.com/office/drawing/2010/main" val="0"/>
               </a:ext>
               <a:ext uri="{96DAC541-7B7A-43D3-8B79-37D633B846F1}">
-                <asvg:svgBlip xmlns:asvg="http://schemas.microsoft.com/office/drawing/2016/SVG/main" r:embed="rId17"/>
+                <asvg:svgBlip xmlns:asvg="http://schemas.microsoft.com/office/drawing/2016/SVG/main" r:embed="rId16"/>
               </a:ext>
             </a:extLst>
           </a:blip>
@@ -4228,58 +4181,6 @@
           </a:fontRef>
         </p:style>
       </p:cxnSp>
-      <p:sp>
-        <p:nvSpPr>
-          <p:cNvPr id="37" name="TextBox 36">
-            <a:extLst>
-              <a:ext uri="{FF2B5EF4-FFF2-40B4-BE49-F238E27FC236}">
-                <a16:creationId xmlns:a16="http://schemas.microsoft.com/office/drawing/2014/main" id="{0629EEDA-3510-734F-C548-C35D2F423F83}"/>
-              </a:ext>
-            </a:extLst>
-          </p:cNvPr>
-          <p:cNvSpPr txBox="1"/>
-          <p:nvPr/>
-        </p:nvSpPr>
-        <p:spPr>
-          <a:xfrm>
-            <a:off x="1740037" y="3018453"/>
-            <a:ext cx="949973" cy="369332"/>
-          </a:xfrm>
-          <a:prstGeom prst="rect">
-            <a:avLst/>
-          </a:prstGeom>
-          <a:noFill/>
-        </p:spPr>
-        <p:txBody>
-          <a:bodyPr wrap="square" rtlCol="0">
-            <a:spAutoFit/>
-          </a:bodyPr>
-          <a:lstStyle/>
-          <a:p>
-            <a:r>
-              <a:rPr lang="de-DE" dirty="0"/>
-              <a:t>`</a:t>
-            </a:r>
-            <a:r>
-              <a:rPr lang="de-DE" dirty="0" err="1"/>
-              <a:t>azd</a:t>
-            </a:r>
-            <a:r>
-              <a:rPr lang="de-DE" dirty="0"/>
-              <a:t> </a:t>
-            </a:r>
-            <a:r>
-              <a:rPr lang="de-DE" dirty="0" err="1"/>
-              <a:t>up</a:t>
-            </a:r>
-            <a:r>
-              <a:rPr lang="de-DE" dirty="0"/>
-              <a:t>`</a:t>
-            </a:r>
-            <a:endParaRPr lang="en-DE" dirty="0"/>
-          </a:p>
-        </p:txBody>
-      </p:sp>
       <p:cxnSp>
         <p:nvCxnSpPr>
           <p:cNvPr id="39" name="Straight Arrow Connector 38">
@@ -4491,43 +4392,6 @@
       </p:sp>
       <p:sp>
         <p:nvSpPr>
-          <p:cNvPr id="46" name="TextBox 45">
-            <a:extLst>
-              <a:ext uri="{FF2B5EF4-FFF2-40B4-BE49-F238E27FC236}">
-                <a16:creationId xmlns:a16="http://schemas.microsoft.com/office/drawing/2014/main" id="{9201CAC2-5FB7-F402-BC5A-A11B693E236C}"/>
-              </a:ext>
-            </a:extLst>
-          </p:cNvPr>
-          <p:cNvSpPr txBox="1"/>
-          <p:nvPr/>
-        </p:nvSpPr>
-        <p:spPr>
-          <a:xfrm>
-            <a:off x="0" y="1533301"/>
-            <a:ext cx="949973" cy="338554"/>
-          </a:xfrm>
-          <a:prstGeom prst="rect">
-            <a:avLst/>
-          </a:prstGeom>
-          <a:noFill/>
-        </p:spPr>
-        <p:txBody>
-          <a:bodyPr wrap="square" rtlCol="0">
-            <a:spAutoFit/>
-          </a:bodyPr>
-          <a:lstStyle/>
-          <a:p>
-            <a:pPr algn="ctr"/>
-            <a:r>
-              <a:rPr lang="de-DE" sz="1600" dirty="0"/>
-              <a:t>GitHub</a:t>
-            </a:r>
-            <a:endParaRPr lang="en-DE" sz="1600" dirty="0"/>
-          </a:p>
-        </p:txBody>
-      </p:sp>
-      <p:sp>
-        <p:nvSpPr>
           <p:cNvPr id="47" name="TextBox 46">
             <a:extLst>
               <a:ext uri="{FF2B5EF4-FFF2-40B4-BE49-F238E27FC236}">
@@ -4618,13 +4482,13 @@
           <p:nvPr/>
         </p:nvPicPr>
         <p:blipFill>
-          <a:blip r:embed="rId18">
+          <a:blip r:embed="rId17">
             <a:extLst>
               <a:ext uri="{28A0092B-C50C-407E-A947-70E740481C1C}">
                 <a14:useLocalDpi xmlns:a14="http://schemas.microsoft.com/office/drawing/2010/main" val="0"/>
               </a:ext>
               <a:ext uri="{96DAC541-7B7A-43D3-8B79-37D633B846F1}">
-                <asvg:svgBlip xmlns:asvg="http://schemas.microsoft.com/office/drawing/2016/SVG/main" r:embed="rId19"/>
+                <asvg:svgBlip xmlns:asvg="http://schemas.microsoft.com/office/drawing/2016/SVG/main" r:embed="rId18"/>
               </a:ext>
             </a:extLst>
           </a:blip>
@@ -4957,13 +4821,13 @@
           <p:nvPr/>
         </p:nvPicPr>
         <p:blipFill>
-          <a:blip r:embed="rId20">
+          <a:blip r:embed="rId19">
             <a:extLst>
               <a:ext uri="{28A0092B-C50C-407E-A947-70E740481C1C}">
                 <a14:useLocalDpi xmlns:a14="http://schemas.microsoft.com/office/drawing/2010/main" val="0"/>
               </a:ext>
               <a:ext uri="{96DAC541-7B7A-43D3-8B79-37D633B846F1}">
-                <asvg:svgBlip xmlns:asvg="http://schemas.microsoft.com/office/drawing/2016/SVG/main" r:embed="rId21"/>
+                <asvg:svgBlip xmlns:asvg="http://schemas.microsoft.com/office/drawing/2016/SVG/main" r:embed="rId20"/>
               </a:ext>
             </a:extLst>
           </a:blip>
@@ -5103,7 +4967,7 @@
           <p:nvPr/>
         </p:nvPicPr>
         <p:blipFill>
-          <a:blip r:embed="rId22">
+          <a:blip r:embed="rId21">
             <a:extLst>
               <a:ext uri="{28A0092B-C50C-407E-A947-70E740481C1C}">
                 <a14:useLocalDpi xmlns:a14="http://schemas.microsoft.com/office/drawing/2010/main" val="0"/>
@@ -5240,12 +5104,49 @@
           </a:p>
         </p:txBody>
       </p:sp>
+      <p:sp>
+        <p:nvSpPr>
+          <p:cNvPr id="6" name="TextBox 5">
+            <a:extLst>
+              <a:ext uri="{FF2B5EF4-FFF2-40B4-BE49-F238E27FC236}">
+                <a16:creationId xmlns:a16="http://schemas.microsoft.com/office/drawing/2014/main" id="{B0080B50-0B71-235E-F184-EE01F7C63906}"/>
+              </a:ext>
+            </a:extLst>
+          </p:cNvPr>
+          <p:cNvSpPr txBox="1"/>
+          <p:nvPr/>
+        </p:nvSpPr>
+        <p:spPr>
+          <a:xfrm>
+            <a:off x="192905" y="2522520"/>
+            <a:ext cx="1553547" cy="338554"/>
+          </a:xfrm>
+          <a:prstGeom prst="rect">
+            <a:avLst/>
+          </a:prstGeom>
+          <a:noFill/>
+        </p:spPr>
+        <p:txBody>
+          <a:bodyPr wrap="square" rtlCol="0">
+            <a:spAutoFit/>
+          </a:bodyPr>
+          <a:lstStyle/>
+          <a:p>
+            <a:pPr algn="ctr"/>
+            <a:r>
+              <a:rPr lang="de-DE" sz="1600" dirty="0" err="1"/>
+              <a:t>Codespaces</a:t>
+            </a:r>
+            <a:endParaRPr lang="en-DE" sz="1600" dirty="0"/>
+          </a:p>
+        </p:txBody>
+      </p:sp>
       <p:pic>
         <p:nvPicPr>
-          <p:cNvPr id="4" name="Picture 2">
-            <a:extLst>
-              <a:ext uri="{FF2B5EF4-FFF2-40B4-BE49-F238E27FC236}">
-                <a16:creationId xmlns:a16="http://schemas.microsoft.com/office/drawing/2014/main" id="{D1E175EB-23E3-E644-B8E1-7F16DE20D0AF}"/>
+          <p:cNvPr id="2" name="Picture 4" descr="GitHub Codespaces - Visual Studio Marketplace">
+            <a:extLst>
+              <a:ext uri="{FF2B5EF4-FFF2-40B4-BE49-F238E27FC236}">
+                <a16:creationId xmlns:a16="http://schemas.microsoft.com/office/drawing/2014/main" id="{6A8A17B2-7BE4-D427-D899-F5CEB0C8B68E}"/>
               </a:ext>
             </a:extLst>
           </p:cNvPr>
@@ -5255,7 +5156,7 @@
           <p:nvPr/>
         </p:nvPicPr>
         <p:blipFill>
-          <a:blip r:embed="rId23">
+          <a:blip r:embed="rId22">
             <a:extLst>
               <a:ext uri="{28A0092B-C50C-407E-A947-70E740481C1C}">
                 <a14:useLocalDpi xmlns:a14="http://schemas.microsoft.com/office/drawing/2010/main" val="0"/>
@@ -5269,8 +5170,8 @@
         </p:blipFill>
         <p:spPr bwMode="auto">
           <a:xfrm>
-            <a:off x="653086" y="3067146"/>
-            <a:ext cx="584775" cy="584775"/>
+            <a:off x="510898" y="2823582"/>
+            <a:ext cx="890320" cy="893791"/>
           </a:xfrm>
           <a:prstGeom prst="rect">
             <a:avLst/>
@@ -5289,38 +5190,97 @@
       </p:pic>
       <p:sp>
         <p:nvSpPr>
-          <p:cNvPr id="6" name="TextBox 5">
-            <a:extLst>
-              <a:ext uri="{FF2B5EF4-FFF2-40B4-BE49-F238E27FC236}">
-                <a16:creationId xmlns:a16="http://schemas.microsoft.com/office/drawing/2014/main" id="{B0080B50-0B71-235E-F184-EE01F7C63906}"/>
-              </a:ext>
-            </a:extLst>
-          </p:cNvPr>
-          <p:cNvSpPr txBox="1"/>
+          <p:cNvPr id="3" name="Rectangle: Rounded Corners 2">
+            <a:extLst>
+              <a:ext uri="{FF2B5EF4-FFF2-40B4-BE49-F238E27FC236}">
+                <a16:creationId xmlns:a16="http://schemas.microsoft.com/office/drawing/2014/main" id="{C9860457-F3DC-3FAC-3CEE-144C038BF601}"/>
+              </a:ext>
+            </a:extLst>
+          </p:cNvPr>
+          <p:cNvSpPr/>
           <p:nvPr/>
         </p:nvSpPr>
         <p:spPr>
           <a:xfrm>
-            <a:off x="489054" y="2718755"/>
-            <a:ext cx="949973" cy="338554"/>
-          </a:xfrm>
-          <a:prstGeom prst="rect">
+            <a:off x="1513938" y="2925622"/>
+            <a:ext cx="1279994" cy="405227"/>
+          </a:xfrm>
+          <a:prstGeom prst="roundRect">
             <a:avLst/>
           </a:prstGeom>
-          <a:noFill/>
-        </p:spPr>
-        <p:txBody>
-          <a:bodyPr wrap="square" rtlCol="0">
-            <a:spAutoFit/>
-          </a:bodyPr>
+          <a:solidFill>
+            <a:srgbClr val="EFF1F3"/>
+          </a:solidFill>
+          <a:ln w="9525">
+            <a:noFill/>
+          </a:ln>
+        </p:spPr>
+        <p:style>
+          <a:lnRef idx="2">
+            <a:schemeClr val="accent1">
+              <a:shade val="50000"/>
+            </a:schemeClr>
+          </a:lnRef>
+          <a:fillRef idx="1">
+            <a:schemeClr val="accent1"/>
+          </a:fillRef>
+          <a:effectRef idx="0">
+            <a:schemeClr val="accent1"/>
+          </a:effectRef>
+          <a:fontRef idx="minor">
+            <a:schemeClr val="lt1"/>
+          </a:fontRef>
+        </p:style>
+        <p:txBody>
+          <a:bodyPr rtlCol="0" anchor="ctr"/>
           <a:lstStyle/>
           <a:p>
             <a:pPr algn="ctr"/>
             <a:r>
-              <a:rPr lang="de-DE" sz="1600" dirty="0"/>
-              <a:t>VS Code</a:t>
-            </a:r>
-            <a:endParaRPr lang="en-DE" sz="1600" dirty="0"/>
+              <a:rPr lang="de-DE" sz="2000" dirty="0" err="1">
+                <a:solidFill>
+                  <a:schemeClr val="tx1">
+                    <a:lumMod val="50000"/>
+                  </a:schemeClr>
+                </a:solidFill>
+                <a:latin typeface="72 Monospace" panose="020B0509030603020204" pitchFamily="49" charset="0"/>
+                <a:cs typeface="72 Monospace" panose="020B0509030603020204" pitchFamily="49" charset="0"/>
+              </a:rPr>
+              <a:t>azd</a:t>
+            </a:r>
+            <a:r>
+              <a:rPr lang="de-DE" sz="900" dirty="0">
+                <a:solidFill>
+                  <a:schemeClr val="tx1">
+                    <a:lumMod val="50000"/>
+                  </a:schemeClr>
+                </a:solidFill>
+                <a:latin typeface="72 Monospace" panose="020B0509030603020204" pitchFamily="49" charset="0"/>
+                <a:cs typeface="72 Monospace" panose="020B0509030603020204" pitchFamily="49" charset="0"/>
+              </a:rPr>
+              <a:t> </a:t>
+            </a:r>
+            <a:r>
+              <a:rPr lang="de-DE" sz="2000" dirty="0" err="1">
+                <a:solidFill>
+                  <a:schemeClr val="tx1">
+                    <a:lumMod val="50000"/>
+                  </a:schemeClr>
+                </a:solidFill>
+                <a:latin typeface="72 Monospace" panose="020B0509030603020204" pitchFamily="49" charset="0"/>
+                <a:cs typeface="72 Monospace" panose="020B0509030603020204" pitchFamily="49" charset="0"/>
+              </a:rPr>
+              <a:t>up</a:t>
+            </a:r>
+            <a:endParaRPr lang="en-DE" sz="2000" dirty="0">
+              <a:solidFill>
+                <a:schemeClr val="tx1">
+                  <a:lumMod val="50000"/>
+                </a:schemeClr>
+              </a:solidFill>
+              <a:latin typeface="72 Monospace" panose="020B0509030603020204" pitchFamily="49" charset="0"/>
+              <a:cs typeface="72 Monospace" panose="020B0509030603020204" pitchFamily="49" charset="0"/>
+            </a:endParaRPr>
           </a:p>
         </p:txBody>
       </p:sp>

</xml_diff>

<commit_message>
Update assets, views, and hooks
</commit_message>
<xml_diff>
--- a/assets/drawings.pptx
+++ b/assets/drawings.pptx
@@ -261,7 +261,7 @@
           <a:p>
             <a:fld id="{40E102C9-DE61-4CD8-AC35-112A0980813C}" type="datetimeFigureOut">
               <a:rPr lang="en-DE" smtClean="0"/>
-              <a:t>12/05/2023</a:t>
+              <a:t>15/12/2023</a:t>
             </a:fld>
             <a:endParaRPr lang="en-DE"/>
           </a:p>
@@ -461,7 +461,7 @@
           <a:p>
             <a:fld id="{40E102C9-DE61-4CD8-AC35-112A0980813C}" type="datetimeFigureOut">
               <a:rPr lang="en-DE" smtClean="0"/>
-              <a:t>12/05/2023</a:t>
+              <a:t>15/12/2023</a:t>
             </a:fld>
             <a:endParaRPr lang="en-DE"/>
           </a:p>
@@ -671,7 +671,7 @@
           <a:p>
             <a:fld id="{40E102C9-DE61-4CD8-AC35-112A0980813C}" type="datetimeFigureOut">
               <a:rPr lang="en-DE" smtClean="0"/>
-              <a:t>12/05/2023</a:t>
+              <a:t>15/12/2023</a:t>
             </a:fld>
             <a:endParaRPr lang="en-DE"/>
           </a:p>
@@ -871,7 +871,7 @@
           <a:p>
             <a:fld id="{40E102C9-DE61-4CD8-AC35-112A0980813C}" type="datetimeFigureOut">
               <a:rPr lang="en-DE" smtClean="0"/>
-              <a:t>12/05/2023</a:t>
+              <a:t>15/12/2023</a:t>
             </a:fld>
             <a:endParaRPr lang="en-DE"/>
           </a:p>
@@ -1147,7 +1147,7 @@
           <a:p>
             <a:fld id="{40E102C9-DE61-4CD8-AC35-112A0980813C}" type="datetimeFigureOut">
               <a:rPr lang="en-DE" smtClean="0"/>
-              <a:t>12/05/2023</a:t>
+              <a:t>15/12/2023</a:t>
             </a:fld>
             <a:endParaRPr lang="en-DE"/>
           </a:p>
@@ -1415,7 +1415,7 @@
           <a:p>
             <a:fld id="{40E102C9-DE61-4CD8-AC35-112A0980813C}" type="datetimeFigureOut">
               <a:rPr lang="en-DE" smtClean="0"/>
-              <a:t>12/05/2023</a:t>
+              <a:t>15/12/2023</a:t>
             </a:fld>
             <a:endParaRPr lang="en-DE"/>
           </a:p>
@@ -1830,7 +1830,7 @@
           <a:p>
             <a:fld id="{40E102C9-DE61-4CD8-AC35-112A0980813C}" type="datetimeFigureOut">
               <a:rPr lang="en-DE" smtClean="0"/>
-              <a:t>12/05/2023</a:t>
+              <a:t>15/12/2023</a:t>
             </a:fld>
             <a:endParaRPr lang="en-DE"/>
           </a:p>
@@ -1972,7 +1972,7 @@
           <a:p>
             <a:fld id="{40E102C9-DE61-4CD8-AC35-112A0980813C}" type="datetimeFigureOut">
               <a:rPr lang="en-DE" smtClean="0"/>
-              <a:t>12/05/2023</a:t>
+              <a:t>15/12/2023</a:t>
             </a:fld>
             <a:endParaRPr lang="en-DE"/>
           </a:p>
@@ -2085,7 +2085,7 @@
           <a:p>
             <a:fld id="{40E102C9-DE61-4CD8-AC35-112A0980813C}" type="datetimeFigureOut">
               <a:rPr lang="en-DE" smtClean="0"/>
-              <a:t>12/05/2023</a:t>
+              <a:t>15/12/2023</a:t>
             </a:fld>
             <a:endParaRPr lang="en-DE"/>
           </a:p>
@@ -2398,7 +2398,7 @@
           <a:p>
             <a:fld id="{40E102C9-DE61-4CD8-AC35-112A0980813C}" type="datetimeFigureOut">
               <a:rPr lang="en-DE" smtClean="0"/>
-              <a:t>12/05/2023</a:t>
+              <a:t>15/12/2023</a:t>
             </a:fld>
             <a:endParaRPr lang="en-DE"/>
           </a:p>
@@ -2687,7 +2687,7 @@
           <a:p>
             <a:fld id="{40E102C9-DE61-4CD8-AC35-112A0980813C}" type="datetimeFigureOut">
               <a:rPr lang="en-DE" smtClean="0"/>
-              <a:t>12/05/2023</a:t>
+              <a:t>15/12/2023</a:t>
             </a:fld>
             <a:endParaRPr lang="en-DE"/>
           </a:p>
@@ -2930,7 +2930,7 @@
           <a:p>
             <a:fld id="{40E102C9-DE61-4CD8-AC35-112A0980813C}" type="datetimeFigureOut">
               <a:rPr lang="en-DE" smtClean="0"/>
-              <a:t>12/05/2023</a:t>
+              <a:t>15/12/2023</a:t>
             </a:fld>
             <a:endParaRPr lang="en-DE"/>
           </a:p>
@@ -3361,8 +3361,8 @@
         </p:nvSpPr>
         <p:spPr>
           <a:xfrm>
-            <a:off x="103220" y="706794"/>
-            <a:ext cx="11497842" cy="5444412"/>
+            <a:off x="103220" y="672213"/>
+            <a:ext cx="11497842" cy="5787363"/>
           </a:xfrm>
           <a:prstGeom prst="rect">
             <a:avLst/>
@@ -3749,7 +3749,7 @@
         <p:spPr>
           <a:xfrm>
             <a:off x="4637314" y="2332654"/>
-            <a:ext cx="0" cy="3298371"/>
+            <a:ext cx="0" cy="3240734"/>
           </a:xfrm>
           <a:prstGeom prst="line">
             <a:avLst/>
@@ -3808,7 +3808,7 @@
         </p:blipFill>
         <p:spPr>
           <a:xfrm>
-            <a:off x="5652357" y="5278114"/>
+            <a:off x="5352987" y="5278113"/>
             <a:ext cx="358548" cy="295275"/>
           </a:xfrm>
           <a:prstGeom prst="rect">
@@ -4100,13 +4100,13 @@
         </p:nvSpPr>
         <p:spPr>
           <a:xfrm>
-            <a:off x="3288508" y="1743658"/>
-            <a:ext cx="596089" cy="3858208"/>
+            <a:off x="3288508" y="1743657"/>
+            <a:ext cx="596089" cy="4603580"/>
           </a:xfrm>
           <a:prstGeom prst="leftBrace">
             <a:avLst>
               <a:gd name="adj1" fmla="val 47466"/>
-              <a:gd name="adj2" fmla="val 50000"/>
+              <a:gd name="adj2" fmla="val 35632"/>
             </a:avLst>
           </a:prstGeom>
           <a:ln w="28575">
@@ -4498,8 +4498,8 @@
         </p:blipFill>
         <p:spPr>
           <a:xfrm>
-            <a:off x="3932270" y="812249"/>
-            <a:ext cx="514350" cy="514350"/>
+            <a:off x="3884597" y="672213"/>
+            <a:ext cx="562023" cy="562023"/>
           </a:xfrm>
           <a:prstGeom prst="rect">
             <a:avLst/>
@@ -4520,7 +4520,7 @@
         </p:nvSpPr>
         <p:spPr>
           <a:xfrm>
-            <a:off x="4534980" y="903101"/>
+            <a:off x="4534980" y="810738"/>
             <a:ext cx="2062820" cy="338554"/>
           </a:xfrm>
           <a:prstGeom prst="rect">
@@ -5550,6 +5550,220 @@
               <a:t>register</a:t>
             </a:r>
             <a:endParaRPr lang="en-DE" sz="1400" dirty="0"/>
+          </a:p>
+        </p:txBody>
+      </p:sp>
+      <p:pic>
+        <p:nvPicPr>
+          <p:cNvPr id="3" name="Picture 2" descr="A blue and white diamond&#10;&#10;Description automatically generated with low confidence">
+            <a:extLst>
+              <a:ext uri="{FF2B5EF4-FFF2-40B4-BE49-F238E27FC236}">
+                <a16:creationId xmlns:a16="http://schemas.microsoft.com/office/drawing/2014/main" id="{C8F72890-059D-53E5-1150-AAFEAFA839B4}"/>
+              </a:ext>
+            </a:extLst>
+          </p:cNvPr>
+          <p:cNvPicPr>
+            <a:picLocks noChangeAspect="1" noChangeArrowheads="1"/>
+          </p:cNvPicPr>
+          <p:nvPr/>
+        </p:nvPicPr>
+        <p:blipFill>
+          <a:blip r:embed="rId27">
+            <a:extLst>
+              <a:ext uri="{28A0092B-C50C-407E-A947-70E740481C1C}">
+                <a14:useLocalDpi xmlns:a14="http://schemas.microsoft.com/office/drawing/2010/main" val="0"/>
+              </a:ext>
+            </a:extLst>
+          </a:blip>
+          <a:srcRect/>
+          <a:stretch>
+            <a:fillRect/>
+          </a:stretch>
+        </p:blipFill>
+        <p:spPr bwMode="auto">
+          <a:xfrm>
+            <a:off x="6871625" y="789314"/>
+            <a:ext cx="399423" cy="399423"/>
+          </a:xfrm>
+          <a:prstGeom prst="rect">
+            <a:avLst/>
+          </a:prstGeom>
+          <a:noFill/>
+          <a:extLst>
+            <a:ext uri="{909E8E84-426E-40DD-AFC4-6F175D3DCCD1}">
+              <a14:hiddenFill xmlns:a14="http://schemas.microsoft.com/office/drawing/2010/main">
+                <a:solidFill>
+                  <a:srgbClr val="FFFFFF"/>
+                </a:solidFill>
+              </a14:hiddenFill>
+            </a:ext>
+          </a:extLst>
+        </p:spPr>
+      </p:pic>
+      <p:sp>
+        <p:nvSpPr>
+          <p:cNvPr id="14" name="TextBox 13">
+            <a:extLst>
+              <a:ext uri="{FF2B5EF4-FFF2-40B4-BE49-F238E27FC236}">
+                <a16:creationId xmlns:a16="http://schemas.microsoft.com/office/drawing/2014/main" id="{000355CA-4666-64A2-5BD0-79569809DD3D}"/>
+              </a:ext>
+            </a:extLst>
+          </p:cNvPr>
+          <p:cNvSpPr txBox="1"/>
+          <p:nvPr/>
+        </p:nvSpPr>
+        <p:spPr>
+          <a:xfrm>
+            <a:off x="7271048" y="861463"/>
+            <a:ext cx="3526258" cy="307777"/>
+          </a:xfrm>
+          <a:prstGeom prst="rect">
+            <a:avLst/>
+          </a:prstGeom>
+          <a:noFill/>
+        </p:spPr>
+        <p:txBody>
+          <a:bodyPr wrap="square" rtlCol="0">
+            <a:spAutoFit/>
+          </a:bodyPr>
+          <a:lstStyle/>
+          <a:p>
+            <a:r>
+              <a:rPr lang="de-DE" sz="1400" dirty="0">
+                <a:solidFill>
+                  <a:srgbClr val="074793"/>
+                </a:solidFill>
+              </a:rPr>
+              <a:t>Microsoft </a:t>
+            </a:r>
+            <a:r>
+              <a:rPr lang="de-DE" sz="1400" dirty="0" err="1">
+                <a:solidFill>
+                  <a:srgbClr val="074793"/>
+                </a:solidFill>
+              </a:rPr>
+              <a:t>Entra</a:t>
+            </a:r>
+            <a:r>
+              <a:rPr lang="de-DE" sz="1400" dirty="0">
+                <a:solidFill>
+                  <a:srgbClr val="074793"/>
+                </a:solidFill>
+              </a:rPr>
+              <a:t> ID (</a:t>
+            </a:r>
+            <a:r>
+              <a:rPr lang="de-DE" sz="1400" dirty="0" err="1">
+                <a:solidFill>
+                  <a:srgbClr val="074793"/>
+                </a:solidFill>
+              </a:rPr>
+              <a:t>formerly</a:t>
+            </a:r>
+            <a:r>
+              <a:rPr lang="de-DE" sz="1400" dirty="0">
+                <a:solidFill>
+                  <a:srgbClr val="074793"/>
+                </a:solidFill>
+              </a:rPr>
+              <a:t> Azure AD)</a:t>
+            </a:r>
+            <a:endParaRPr lang="en-DE" sz="1400" dirty="0">
+              <a:solidFill>
+                <a:srgbClr val="074793"/>
+              </a:solidFill>
+            </a:endParaRPr>
+          </a:p>
+        </p:txBody>
+      </p:sp>
+      <p:pic>
+        <p:nvPicPr>
+          <p:cNvPr id="17" name="Graphic 16">
+            <a:extLst>
+              <a:ext uri="{FF2B5EF4-FFF2-40B4-BE49-F238E27FC236}">
+                <a16:creationId xmlns:a16="http://schemas.microsoft.com/office/drawing/2014/main" id="{83C2F272-7044-86D4-C046-68A6A14BB37D}"/>
+              </a:ext>
+            </a:extLst>
+          </p:cNvPr>
+          <p:cNvPicPr>
+            <a:picLocks noChangeAspect="1"/>
+          </p:cNvPicPr>
+          <p:nvPr/>
+        </p:nvPicPr>
+        <p:blipFill>
+          <a:blip r:embed="rId28">
+            <a:extLst>
+              <a:ext uri="{28A0092B-C50C-407E-A947-70E740481C1C}">
+                <a14:useLocalDpi xmlns:a14="http://schemas.microsoft.com/office/drawing/2010/main" val="0"/>
+              </a:ext>
+              <a:ext uri="{96DAC541-7B7A-43D3-8B79-37D633B846F1}">
+                <asvg:svgBlip xmlns:asvg="http://schemas.microsoft.com/office/drawing/2016/SVG/main" r:embed="rId29"/>
+              </a:ext>
+            </a:extLst>
+          </a:blip>
+          <a:stretch>
+            <a:fillRect/>
+          </a:stretch>
+        </p:blipFill>
+        <p:spPr>
+          <a:xfrm>
+            <a:off x="4446620" y="5970341"/>
+            <a:ext cx="489235" cy="489235"/>
+          </a:xfrm>
+          <a:prstGeom prst="rect">
+            <a:avLst/>
+          </a:prstGeom>
+        </p:spPr>
+      </p:pic>
+      <p:sp>
+        <p:nvSpPr>
+          <p:cNvPr id="25" name="TextBox 24">
+            <a:extLst>
+              <a:ext uri="{FF2B5EF4-FFF2-40B4-BE49-F238E27FC236}">
+                <a16:creationId xmlns:a16="http://schemas.microsoft.com/office/drawing/2014/main" id="{37BE062C-A394-3A78-DDE1-F240453D1841}"/>
+              </a:ext>
+            </a:extLst>
+          </p:cNvPr>
+          <p:cNvSpPr txBox="1"/>
+          <p:nvPr/>
+        </p:nvSpPr>
+        <p:spPr>
+          <a:xfrm>
+            <a:off x="4928519" y="6008687"/>
+            <a:ext cx="3313971" cy="338554"/>
+          </a:xfrm>
+          <a:prstGeom prst="rect">
+            <a:avLst/>
+          </a:prstGeom>
+          <a:noFill/>
+        </p:spPr>
+        <p:txBody>
+          <a:bodyPr wrap="square" rtlCol="0">
+            <a:spAutoFit/>
+          </a:bodyPr>
+          <a:lstStyle/>
+          <a:p>
+            <a:r>
+              <a:rPr lang="de-DE" sz="1600" dirty="0" err="1">
+                <a:solidFill>
+                  <a:srgbClr val="074793"/>
+                </a:solidFill>
+              </a:rPr>
+              <a:t>Entra</a:t>
+            </a:r>
+            <a:r>
+              <a:rPr lang="de-DE" sz="1600" dirty="0">
+                <a:solidFill>
+                  <a:srgbClr val="074793"/>
+                </a:solidFill>
+              </a:rPr>
+              <a:t> ID App Registration</a:t>
+            </a:r>
+            <a:endParaRPr lang="en-DE" sz="1600" dirty="0">
+              <a:solidFill>
+                <a:srgbClr val="074793"/>
+              </a:solidFill>
+            </a:endParaRPr>
           </a:p>
         </p:txBody>
       </p:sp>

</xml_diff>

<commit_message>
web app apim pre-auth added, and authentication documentation
</commit_message>
<xml_diff>
--- a/assets/drawings.pptx
+++ b/assets/drawings.pptx
@@ -261,7 +261,7 @@
           <a:p>
             <a:fld id="{40E102C9-DE61-4CD8-AC35-112A0980813C}" type="datetimeFigureOut">
               <a:rPr lang="en-DE" smtClean="0"/>
-              <a:t>15/12/2023</a:t>
+              <a:t>18/12/2023</a:t>
             </a:fld>
             <a:endParaRPr lang="en-DE"/>
           </a:p>
@@ -461,7 +461,7 @@
           <a:p>
             <a:fld id="{40E102C9-DE61-4CD8-AC35-112A0980813C}" type="datetimeFigureOut">
               <a:rPr lang="en-DE" smtClean="0"/>
-              <a:t>15/12/2023</a:t>
+              <a:t>18/12/2023</a:t>
             </a:fld>
             <a:endParaRPr lang="en-DE"/>
           </a:p>
@@ -671,7 +671,7 @@
           <a:p>
             <a:fld id="{40E102C9-DE61-4CD8-AC35-112A0980813C}" type="datetimeFigureOut">
               <a:rPr lang="en-DE" smtClean="0"/>
-              <a:t>15/12/2023</a:t>
+              <a:t>18/12/2023</a:t>
             </a:fld>
             <a:endParaRPr lang="en-DE"/>
           </a:p>
@@ -871,7 +871,7 @@
           <a:p>
             <a:fld id="{40E102C9-DE61-4CD8-AC35-112A0980813C}" type="datetimeFigureOut">
               <a:rPr lang="en-DE" smtClean="0"/>
-              <a:t>15/12/2023</a:t>
+              <a:t>18/12/2023</a:t>
             </a:fld>
             <a:endParaRPr lang="en-DE"/>
           </a:p>
@@ -1147,7 +1147,7 @@
           <a:p>
             <a:fld id="{40E102C9-DE61-4CD8-AC35-112A0980813C}" type="datetimeFigureOut">
               <a:rPr lang="en-DE" smtClean="0"/>
-              <a:t>15/12/2023</a:t>
+              <a:t>18/12/2023</a:t>
             </a:fld>
             <a:endParaRPr lang="en-DE"/>
           </a:p>
@@ -1415,7 +1415,7 @@
           <a:p>
             <a:fld id="{40E102C9-DE61-4CD8-AC35-112A0980813C}" type="datetimeFigureOut">
               <a:rPr lang="en-DE" smtClean="0"/>
-              <a:t>15/12/2023</a:t>
+              <a:t>18/12/2023</a:t>
             </a:fld>
             <a:endParaRPr lang="en-DE"/>
           </a:p>
@@ -1830,7 +1830,7 @@
           <a:p>
             <a:fld id="{40E102C9-DE61-4CD8-AC35-112A0980813C}" type="datetimeFigureOut">
               <a:rPr lang="en-DE" smtClean="0"/>
-              <a:t>15/12/2023</a:t>
+              <a:t>18/12/2023</a:t>
             </a:fld>
             <a:endParaRPr lang="en-DE"/>
           </a:p>
@@ -1972,7 +1972,7 @@
           <a:p>
             <a:fld id="{40E102C9-DE61-4CD8-AC35-112A0980813C}" type="datetimeFigureOut">
               <a:rPr lang="en-DE" smtClean="0"/>
-              <a:t>15/12/2023</a:t>
+              <a:t>18/12/2023</a:t>
             </a:fld>
             <a:endParaRPr lang="en-DE"/>
           </a:p>
@@ -2085,7 +2085,7 @@
           <a:p>
             <a:fld id="{40E102C9-DE61-4CD8-AC35-112A0980813C}" type="datetimeFigureOut">
               <a:rPr lang="en-DE" smtClean="0"/>
-              <a:t>15/12/2023</a:t>
+              <a:t>18/12/2023</a:t>
             </a:fld>
             <a:endParaRPr lang="en-DE"/>
           </a:p>
@@ -2398,7 +2398,7 @@
           <a:p>
             <a:fld id="{40E102C9-DE61-4CD8-AC35-112A0980813C}" type="datetimeFigureOut">
               <a:rPr lang="en-DE" smtClean="0"/>
-              <a:t>15/12/2023</a:t>
+              <a:t>18/12/2023</a:t>
             </a:fld>
             <a:endParaRPr lang="en-DE"/>
           </a:p>
@@ -2687,7 +2687,7 @@
           <a:p>
             <a:fld id="{40E102C9-DE61-4CD8-AC35-112A0980813C}" type="datetimeFigureOut">
               <a:rPr lang="en-DE" smtClean="0"/>
-              <a:t>15/12/2023</a:t>
+              <a:t>18/12/2023</a:t>
             </a:fld>
             <a:endParaRPr lang="en-DE"/>
           </a:p>
@@ -2930,7 +2930,7 @@
           <a:p>
             <a:fld id="{40E102C9-DE61-4CD8-AC35-112A0980813C}" type="datetimeFigureOut">
               <a:rPr lang="en-DE" smtClean="0"/>
-              <a:t>15/12/2023</a:t>
+              <a:t>18/12/2023</a:t>
             </a:fld>
             <a:endParaRPr lang="en-DE"/>
           </a:p>
@@ -3362,7 +3362,7 @@
         <p:spPr>
           <a:xfrm>
             <a:off x="103220" y="672213"/>
-            <a:ext cx="11497842" cy="5787363"/>
+            <a:ext cx="11497842" cy="6038612"/>
           </a:xfrm>
           <a:prstGeom prst="rect">
             <a:avLst/>
@@ -5764,6 +5764,149 @@
                 <a:srgbClr val="074793"/>
               </a:solidFill>
             </a:endParaRPr>
+          </a:p>
+        </p:txBody>
+      </p:sp>
+      <p:pic>
+        <p:nvPicPr>
+          <p:cNvPr id="15" name="Graphic 14">
+            <a:extLst>
+              <a:ext uri="{FF2B5EF4-FFF2-40B4-BE49-F238E27FC236}">
+                <a16:creationId xmlns:a16="http://schemas.microsoft.com/office/drawing/2014/main" id="{682708C0-2BB6-6080-6F80-E5FDA5B6D984}"/>
+              </a:ext>
+            </a:extLst>
+          </p:cNvPr>
+          <p:cNvPicPr>
+            <a:picLocks noChangeAspect="1"/>
+          </p:cNvPicPr>
+          <p:nvPr/>
+        </p:nvPicPr>
+        <p:blipFill>
+          <a:blip r:embed="rId28">
+            <a:extLst>
+              <a:ext uri="{28A0092B-C50C-407E-A947-70E740481C1C}">
+                <a14:useLocalDpi xmlns:a14="http://schemas.microsoft.com/office/drawing/2010/main" val="0"/>
+              </a:ext>
+              <a:ext uri="{96DAC541-7B7A-43D3-8B79-37D633B846F1}">
+                <asvg:svgBlip xmlns:asvg="http://schemas.microsoft.com/office/drawing/2016/SVG/main" r:embed="rId29"/>
+              </a:ext>
+            </a:extLst>
+          </a:blip>
+          <a:stretch>
+            <a:fillRect/>
+          </a:stretch>
+        </p:blipFill>
+        <p:spPr>
+          <a:xfrm>
+            <a:off x="9437816" y="3605312"/>
+            <a:ext cx="194139" cy="194139"/>
+          </a:xfrm>
+          <a:prstGeom prst="rect">
+            <a:avLst/>
+          </a:prstGeom>
+        </p:spPr>
+      </p:pic>
+      <p:cxnSp>
+        <p:nvCxnSpPr>
+          <p:cNvPr id="22" name="Connector: Elbow 21">
+            <a:extLst>
+              <a:ext uri="{FF2B5EF4-FFF2-40B4-BE49-F238E27FC236}">
+                <a16:creationId xmlns:a16="http://schemas.microsoft.com/office/drawing/2014/main" id="{FB9EA117-77B2-6083-8BD1-83F9DB791DC1}"/>
+              </a:ext>
+            </a:extLst>
+          </p:cNvPr>
+          <p:cNvCxnSpPr>
+            <a:cxnSpLocks/>
+            <a:stCxn id="17" idx="2"/>
+            <a:endCxn id="15" idx="1"/>
+          </p:cNvCxnSpPr>
+          <p:nvPr/>
+        </p:nvCxnSpPr>
+        <p:spPr>
+          <a:xfrm rot="5400000" flipH="1" flipV="1">
+            <a:off x="5685930" y="2707690"/>
+            <a:ext cx="2757194" cy="4746578"/>
+          </a:xfrm>
+          <a:prstGeom prst="bentConnector4">
+            <a:avLst>
+              <a:gd name="adj1" fmla="val -4606"/>
+              <a:gd name="adj2" fmla="val 91884"/>
+            </a:avLst>
+          </a:prstGeom>
+          <a:ln>
+            <a:prstDash val="dash"/>
+          </a:ln>
+        </p:spPr>
+        <p:style>
+          <a:lnRef idx="1">
+            <a:schemeClr val="accent3"/>
+          </a:lnRef>
+          <a:fillRef idx="0">
+            <a:schemeClr val="accent3"/>
+          </a:fillRef>
+          <a:effectRef idx="0">
+            <a:schemeClr val="accent3"/>
+          </a:effectRef>
+          <a:fontRef idx="minor">
+            <a:schemeClr val="tx1"/>
+          </a:fontRef>
+        </p:style>
+      </p:cxnSp>
+      <p:sp>
+        <p:nvSpPr>
+          <p:cNvPr id="41" name="Rectangle: Rounded Corners 40">
+            <a:extLst>
+              <a:ext uri="{FF2B5EF4-FFF2-40B4-BE49-F238E27FC236}">
+                <a16:creationId xmlns:a16="http://schemas.microsoft.com/office/drawing/2014/main" id="{29F6D4DF-9438-1717-FFBD-4ABE6A3870F9}"/>
+              </a:ext>
+            </a:extLst>
+          </p:cNvPr>
+          <p:cNvSpPr/>
+          <p:nvPr/>
+        </p:nvSpPr>
+        <p:spPr>
+          <a:xfrm>
+            <a:off x="6732589" y="6495926"/>
+            <a:ext cx="1211543" cy="214899"/>
+          </a:xfrm>
+          <a:prstGeom prst="roundRect">
+            <a:avLst>
+              <a:gd name="adj" fmla="val 42718"/>
+            </a:avLst>
+          </a:prstGeom>
+          <a:solidFill>
+            <a:srgbClr val="7F7F7F"/>
+          </a:solidFill>
+          <a:ln>
+            <a:noFill/>
+          </a:ln>
+        </p:spPr>
+        <p:style>
+          <a:lnRef idx="2">
+            <a:schemeClr val="accent1">
+              <a:shade val="50000"/>
+            </a:schemeClr>
+          </a:lnRef>
+          <a:fillRef idx="1">
+            <a:schemeClr val="accent1"/>
+          </a:fillRef>
+          <a:effectRef idx="0">
+            <a:schemeClr val="accent1"/>
+          </a:effectRef>
+          <a:fontRef idx="minor">
+            <a:schemeClr val="lt1"/>
+          </a:fontRef>
+        </p:style>
+        <p:txBody>
+          <a:bodyPr rtlCol="0" anchor="ctr"/>
+          <a:lstStyle/>
+          <a:p>
+            <a:pPr algn="ctr"/>
+            <a:r>
+              <a:rPr lang="de-DE" sz="1400" dirty="0" err="1"/>
+              <a:t>authorized</a:t>
+            </a:r>
+            <a:endParaRPr lang="en-DE" sz="1400" dirty="0"/>
           </a:p>
         </p:txBody>
       </p:sp>

</xml_diff>